<commit_message>
Updated the code for the talk
</commit_message>
<xml_diff>
--- a/2022/LogicAppsVPowerAutomate.pptx
+++ b/2022/LogicAppsVPowerAutomate.pptx
@@ -5,7 +5,7 @@
     <p:sldMasterId id="2147483660" r:id="rId1"/>
   </p:sldMasterIdLst>
   <p:notesMasterIdLst>
-    <p:notesMasterId r:id="rId18"/>
+    <p:notesMasterId r:id="rId22"/>
   </p:notesMasterIdLst>
   <p:sldIdLst>
     <p:sldId id="256" r:id="rId2"/>
@@ -23,7 +23,11 @@
     <p:sldId id="313" r:id="rId14"/>
     <p:sldId id="315" r:id="rId15"/>
     <p:sldId id="317" r:id="rId16"/>
-    <p:sldId id="299" r:id="rId17"/>
+    <p:sldId id="319" r:id="rId17"/>
+    <p:sldId id="320" r:id="rId18"/>
+    <p:sldId id="321" r:id="rId19"/>
+    <p:sldId id="322" r:id="rId20"/>
+    <p:sldId id="299" r:id="rId21"/>
   </p:sldIdLst>
   <p:sldSz cx="12192000" cy="6858000"/>
   <p:notesSz cx="6858000" cy="9144000"/>
@@ -235,7 +239,7 @@
           <a:p>
             <a:fld id="{4F03D2CD-ADDE-4FBB-A6B1-E89B6908C7B6}" type="datetimeFigureOut">
               <a:rPr lang="en-IN" smtClean="0"/>
-              <a:t>05-11-2022</a:t>
+              <a:t>06-11-2022</a:t>
             </a:fld>
             <a:endParaRPr lang="en-IN"/>
           </a:p>
@@ -1088,7 +1092,7 @@
           <a:p>
             <a:fld id="{CA3C3E0B-5C61-43D6-9D81-600B5AD6AF03}" type="slidenum">
               <a:rPr lang="en-IN" smtClean="0"/>
-              <a:t>16</a:t>
+              <a:t>20</a:t>
             </a:fld>
             <a:endParaRPr lang="en-IN"/>
           </a:p>
@@ -1240,7 +1244,7 @@
           <a:p>
             <a:fld id="{8AE07E44-65BA-4930-B56A-FA68AE0EE6F6}" type="datetimeFigureOut">
               <a:rPr lang="en-IN" smtClean="0"/>
-              <a:t>05-11-2022</a:t>
+              <a:t>06-11-2022</a:t>
             </a:fld>
             <a:endParaRPr lang="en-IN"/>
           </a:p>
@@ -1527,7 +1531,7 @@
           <a:p>
             <a:fld id="{8AE07E44-65BA-4930-B56A-FA68AE0EE6F6}" type="datetimeFigureOut">
               <a:rPr lang="en-IN" smtClean="0"/>
-              <a:t>05-11-2022</a:t>
+              <a:t>06-11-2022</a:t>
             </a:fld>
             <a:endParaRPr lang="en-IN"/>
           </a:p>
@@ -1719,7 +1723,7 @@
           <a:p>
             <a:fld id="{8AE07E44-65BA-4930-B56A-FA68AE0EE6F6}" type="datetimeFigureOut">
               <a:rPr lang="en-IN" smtClean="0"/>
-              <a:t>05-11-2022</a:t>
+              <a:t>06-11-2022</a:t>
             </a:fld>
             <a:endParaRPr lang="en-IN"/>
           </a:p>
@@ -1980,7 +1984,7 @@
           <a:p>
             <a:fld id="{8AE07E44-65BA-4930-B56A-FA68AE0EE6F6}" type="datetimeFigureOut">
               <a:rPr lang="en-IN" smtClean="0"/>
-              <a:t>05-11-2022</a:t>
+              <a:t>06-11-2022</a:t>
             </a:fld>
             <a:endParaRPr lang="en-IN"/>
           </a:p>
@@ -2404,7 +2408,7 @@
           <a:p>
             <a:fld id="{8AE07E44-65BA-4930-B56A-FA68AE0EE6F6}" type="datetimeFigureOut">
               <a:rPr lang="en-IN" smtClean="0"/>
-              <a:t>05-11-2022</a:t>
+              <a:t>06-11-2022</a:t>
             </a:fld>
             <a:endParaRPr lang="en-IN"/>
           </a:p>
@@ -2950,7 +2954,7 @@
           <a:p>
             <a:fld id="{8AE07E44-65BA-4930-B56A-FA68AE0EE6F6}" type="datetimeFigureOut">
               <a:rPr lang="en-IN" smtClean="0"/>
-              <a:t>05-11-2022</a:t>
+              <a:t>06-11-2022</a:t>
             </a:fld>
             <a:endParaRPr lang="en-IN"/>
           </a:p>
@@ -3790,7 +3794,7 @@
           <a:p>
             <a:fld id="{8AE07E44-65BA-4930-B56A-FA68AE0EE6F6}" type="datetimeFigureOut">
               <a:rPr lang="en-IN" smtClean="0"/>
-              <a:t>05-11-2022</a:t>
+              <a:t>06-11-2022</a:t>
             </a:fld>
             <a:endParaRPr lang="en-IN"/>
           </a:p>
@@ -3960,7 +3964,7 @@
           <a:p>
             <a:fld id="{8AE07E44-65BA-4930-B56A-FA68AE0EE6F6}" type="datetimeFigureOut">
               <a:rPr lang="en-IN" smtClean="0"/>
-              <a:t>05-11-2022</a:t>
+              <a:t>06-11-2022</a:t>
             </a:fld>
             <a:endParaRPr lang="en-IN"/>
           </a:p>
@@ -4144,7 +4148,7 @@
           <a:p>
             <a:fld id="{8AE07E44-65BA-4930-B56A-FA68AE0EE6F6}" type="datetimeFigureOut">
               <a:rPr lang="en-IN" smtClean="0"/>
-              <a:t>05-11-2022</a:t>
+              <a:t>06-11-2022</a:t>
             </a:fld>
             <a:endParaRPr lang="en-IN"/>
           </a:p>
@@ -4314,7 +4318,7 @@
           <a:p>
             <a:fld id="{8AE07E44-65BA-4930-B56A-FA68AE0EE6F6}" type="datetimeFigureOut">
               <a:rPr lang="en-IN" smtClean="0"/>
-              <a:t>05-11-2022</a:t>
+              <a:t>06-11-2022</a:t>
             </a:fld>
             <a:endParaRPr lang="en-IN"/>
           </a:p>
@@ -4562,7 +4566,7 @@
           <a:p>
             <a:fld id="{8AE07E44-65BA-4930-B56A-FA68AE0EE6F6}" type="datetimeFigureOut">
               <a:rPr lang="en-IN" smtClean="0"/>
-              <a:t>05-11-2022</a:t>
+              <a:t>06-11-2022</a:t>
             </a:fld>
             <a:endParaRPr lang="en-IN"/>
           </a:p>
@@ -4799,7 +4803,7 @@
           <a:p>
             <a:fld id="{8AE07E44-65BA-4930-B56A-FA68AE0EE6F6}" type="datetimeFigureOut">
               <a:rPr lang="en-IN" smtClean="0"/>
-              <a:t>05-11-2022</a:t>
+              <a:t>06-11-2022</a:t>
             </a:fld>
             <a:endParaRPr lang="en-IN"/>
           </a:p>
@@ -5172,7 +5176,7 @@
           <a:p>
             <a:fld id="{8AE07E44-65BA-4930-B56A-FA68AE0EE6F6}" type="datetimeFigureOut">
               <a:rPr lang="en-IN" smtClean="0"/>
-              <a:t>05-11-2022</a:t>
+              <a:t>06-11-2022</a:t>
             </a:fld>
             <a:endParaRPr lang="en-IN"/>
           </a:p>
@@ -5290,7 +5294,7 @@
           <a:p>
             <a:fld id="{8AE07E44-65BA-4930-B56A-FA68AE0EE6F6}" type="datetimeFigureOut">
               <a:rPr lang="en-IN" smtClean="0"/>
-              <a:t>05-11-2022</a:t>
+              <a:t>06-11-2022</a:t>
             </a:fld>
             <a:endParaRPr lang="en-IN"/>
           </a:p>
@@ -5385,7 +5389,7 @@
           <a:p>
             <a:fld id="{8AE07E44-65BA-4930-B56A-FA68AE0EE6F6}" type="datetimeFigureOut">
               <a:rPr lang="en-IN" smtClean="0"/>
-              <a:t>05-11-2022</a:t>
+              <a:t>06-11-2022</a:t>
             </a:fld>
             <a:endParaRPr lang="en-IN"/>
           </a:p>
@@ -5636,7 +5640,7 @@
           <a:p>
             <a:fld id="{8AE07E44-65BA-4930-B56A-FA68AE0EE6F6}" type="datetimeFigureOut">
               <a:rPr lang="en-IN" smtClean="0"/>
-              <a:t>05-11-2022</a:t>
+              <a:t>06-11-2022</a:t>
             </a:fld>
             <a:endParaRPr lang="en-IN"/>
           </a:p>
@@ -5923,7 +5927,7 @@
           <a:p>
             <a:fld id="{8AE07E44-65BA-4930-B56A-FA68AE0EE6F6}" type="datetimeFigureOut">
               <a:rPr lang="en-IN" smtClean="0"/>
-              <a:t>05-11-2022</a:t>
+              <a:t>06-11-2022</a:t>
             </a:fld>
             <a:endParaRPr lang="en-IN"/>
           </a:p>
@@ -6136,7 +6140,7 @@
           <a:p>
             <a:fld id="{8AE07E44-65BA-4930-B56A-FA68AE0EE6F6}" type="datetimeFigureOut">
               <a:rPr lang="en-IN" smtClean="0"/>
-              <a:t>05-11-2022</a:t>
+              <a:t>06-11-2022</a:t>
             </a:fld>
             <a:endParaRPr lang="en-IN"/>
           </a:p>
@@ -6635,8 +6639,8 @@
         </p:nvSpPr>
         <p:spPr>
           <a:xfrm>
-            <a:off x="1065320" y="514905"/>
-            <a:ext cx="10546672" cy="2995058"/>
+            <a:off x="1065319" y="514904"/>
+            <a:ext cx="10585397" cy="3906175"/>
           </a:xfrm>
         </p:spPr>
         <p:txBody>
@@ -6647,7 +6651,7 @@
           <a:p>
             <a:r>
               <a:rPr lang="en-US" dirty="0"/>
-              <a:t>Power Automate and Logic Apps: A Beginners Guide to Choose Correct Tech</a:t>
+              <a:t>Power Automate and Logic Apps: A Beginners Guide to Choosing The Correct Tech</a:t>
             </a:r>
             <a:endParaRPr lang="en-IN" dirty="0"/>
           </a:p>
@@ -6671,7 +6675,7 @@
         </p:nvSpPr>
         <p:spPr>
           <a:xfrm>
-            <a:off x="1346447" y="4010410"/>
+            <a:off x="1409509" y="4864918"/>
             <a:ext cx="9144000" cy="410670"/>
           </a:xfrm>
         </p:spPr>
@@ -8284,7 +8288,7 @@
           <a:p>
             <a:r>
               <a:rPr lang="en-US" dirty="0"/>
-              <a:t>Use Cases</a:t>
+              <a:t>Use Case</a:t>
             </a:r>
             <a:endParaRPr lang="en-IN" dirty="0"/>
           </a:p>
@@ -8361,7 +8365,7 @@
           <p:cNvPr id="2" name="Title 1">
             <a:extLst>
               <a:ext uri="{FF2B5EF4-FFF2-40B4-BE49-F238E27FC236}">
-                <a16:creationId xmlns:a16="http://schemas.microsoft.com/office/drawing/2014/main" id="{FE1D71AE-9850-C7BA-5C32-53D670B0376A}"/>
+                <a16:creationId xmlns:a16="http://schemas.microsoft.com/office/drawing/2014/main" id="{85922F25-5B31-AE8B-A9BD-E1420E4CD91B}"/>
               </a:ext>
             </a:extLst>
           </p:cNvPr>
@@ -8374,62 +8378,1417 @@
         </p:nvSpPr>
         <p:spPr>
           <a:xfrm>
-            <a:off x="806218" y="2124635"/>
-            <a:ext cx="10353761" cy="971621"/>
+            <a:off x="0" y="0"/>
+            <a:ext cx="10353761" cy="457200"/>
           </a:xfrm>
         </p:spPr>
         <p:txBody>
-          <a:bodyPr/>
+          <a:bodyPr>
+            <a:normAutofit fontScale="90000"/>
+          </a:bodyPr>
           <a:lstStyle/>
           <a:p>
+            <a:pPr algn="l"/>
             <a:r>
               <a:rPr lang="en-US" dirty="0"/>
-              <a:t>Thank You !!!</a:t>
+              <a:t>Good Banking CORP LTD.</a:t>
             </a:r>
             <a:endParaRPr lang="en-IN" dirty="0"/>
           </a:p>
         </p:txBody>
       </p:sp>
-      <p:pic>
-        <p:nvPicPr>
-          <p:cNvPr id="4" name="Picture 3">
+      <p:sp>
+        <p:nvSpPr>
+          <p:cNvPr id="3" name="Content Placeholder 2">
             <a:extLst>
               <a:ext uri="{FF2B5EF4-FFF2-40B4-BE49-F238E27FC236}">
-                <a16:creationId xmlns:a16="http://schemas.microsoft.com/office/drawing/2014/main" id="{A7E1A72D-622E-DCDF-31FA-7B2B70AE5783}"/>
+                <a16:creationId xmlns:a16="http://schemas.microsoft.com/office/drawing/2014/main" id="{DF59AB53-2A1D-6759-5F09-A1B509AF4B3D}"/>
               </a:ext>
             </a:extLst>
           </p:cNvPr>
-          <p:cNvPicPr>
-            <a:picLocks noChangeAspect="1"/>
-          </p:cNvPicPr>
-          <p:nvPr/>
-        </p:nvPicPr>
-        <p:blipFill>
-          <a:blip r:embed="rId3">
-            <a:extLst>
-              <a:ext uri="{28A0092B-C50C-407E-A947-70E740481C1C}">
-                <a14:useLocalDpi xmlns:a14="http://schemas.microsoft.com/office/drawing/2010/main" val="0"/>
-              </a:ext>
-            </a:extLst>
-          </a:blip>
-          <a:stretch>
-            <a:fillRect/>
-          </a:stretch>
-        </p:blipFill>
+          <p:cNvSpPr>
+            <a:spLocks noGrp="1"/>
+          </p:cNvSpPr>
+          <p:nvPr>
+            <p:ph idx="1"/>
+          </p:nvPr>
+        </p:nvSpPr>
         <p:spPr>
           <a:xfrm>
-            <a:off x="10923072" y="6540768"/>
-            <a:ext cx="1268928" cy="317232"/>
+            <a:off x="0" y="495864"/>
+            <a:ext cx="10353762" cy="6038286"/>
           </a:xfrm>
-          <a:prstGeom prst="rect">
-            <a:avLst/>
-          </a:prstGeom>
         </p:spPr>
-      </p:pic>
+        <p:txBody>
+          <a:bodyPr>
+            <a:normAutofit lnSpcReduction="10000"/>
+          </a:bodyPr>
+          <a:lstStyle/>
+          <a:p>
+            <a:r>
+              <a:rPr lang="en-US" dirty="0"/>
+              <a:t>Good Banking Corp has a backend Loans origination system which stores and manages the loans provided to different parties. The system exposes a exhaustive set of APIs to provide a way to consume/ update loan data</a:t>
+            </a:r>
+          </a:p>
+          <a:p>
+            <a:r>
+              <a:rPr lang="en-US" dirty="0"/>
+              <a:t>Good Banking Corp has a Customer Management system built using VB.NET and is a windows application.</a:t>
+            </a:r>
+          </a:p>
+          <a:p>
+            <a:r>
+              <a:rPr lang="en-US" dirty="0"/>
+              <a:t>Good Banking Corp plans to build a customer website which allows the prospective customers to submit the loan applications</a:t>
+            </a:r>
+          </a:p>
+          <a:p>
+            <a:r>
+              <a:rPr lang="en-US" dirty="0"/>
+              <a:t>Good Banking Corp also plans to build an Underwriting application for the bank underwriters to make a decision on the loans application</a:t>
+            </a:r>
+          </a:p>
+          <a:p>
+            <a:r>
+              <a:rPr lang="en-US" dirty="0"/>
+              <a:t>Good Banking Corp wants to implement following process for the requirements above</a:t>
+            </a:r>
+          </a:p>
+          <a:p>
+            <a:pPr lvl="1"/>
+            <a:r>
+              <a:rPr lang="en-US" dirty="0"/>
+              <a:t>Faster go to market with a Minimal Viable Product to start exploring if they are on correct track</a:t>
+            </a:r>
+          </a:p>
+          <a:p>
+            <a:pPr lvl="1"/>
+            <a:r>
+              <a:rPr lang="en-US" dirty="0"/>
+              <a:t>Implement a Guided Loans Origination Process for the Loans Officers</a:t>
+            </a:r>
+          </a:p>
+          <a:p>
+            <a:pPr lvl="1"/>
+            <a:r>
+              <a:rPr lang="en-US" dirty="0"/>
+              <a:t>Implement a Guided Underwriting Process for the Underwriters</a:t>
+            </a:r>
+          </a:p>
+          <a:p>
+            <a:pPr lvl="1"/>
+            <a:r>
+              <a:rPr lang="en-US" dirty="0"/>
+              <a:t>Implement integrations as required</a:t>
+            </a:r>
+            <a:endParaRPr lang="en-IN" dirty="0"/>
+          </a:p>
+        </p:txBody>
+      </p:sp>
     </p:spTree>
     <p:extLst>
       <p:ext uri="{BB962C8B-B14F-4D97-AF65-F5344CB8AC3E}">
-        <p14:creationId xmlns:p14="http://schemas.microsoft.com/office/powerpoint/2010/main" val="4018789356"/>
+        <p14:creationId xmlns:p14="http://schemas.microsoft.com/office/powerpoint/2010/main" val="3460552121"/>
+      </p:ext>
+    </p:extLst>
+  </p:cSld>
+  <p:clrMapOvr>
+    <a:masterClrMapping/>
+  </p:clrMapOvr>
+</p:sld>
+</file>
+
+<file path=ppt/slides/slide17.xml><?xml version="1.0" encoding="utf-8"?>
+<p:sld xmlns:a="http://schemas.openxmlformats.org/drawingml/2006/main" xmlns:r="http://schemas.openxmlformats.org/officeDocument/2006/relationships" xmlns:p="http://schemas.openxmlformats.org/presentationml/2006/main">
+  <p:cSld>
+    <p:spTree>
+      <p:nvGrpSpPr>
+        <p:cNvPr id="1" name=""/>
+        <p:cNvGrpSpPr/>
+        <p:nvPr/>
+      </p:nvGrpSpPr>
+      <p:grpSpPr>
+        <a:xfrm>
+          <a:off x="0" y="0"/>
+          <a:ext cx="0" cy="0"/>
+          <a:chOff x="0" y="0"/>
+          <a:chExt cx="0" cy="0"/>
+        </a:xfrm>
+      </p:grpSpPr>
+      <p:sp>
+        <p:nvSpPr>
+          <p:cNvPr id="2" name="Title 1">
+            <a:extLst>
+              <a:ext uri="{FF2B5EF4-FFF2-40B4-BE49-F238E27FC236}">
+                <a16:creationId xmlns:a16="http://schemas.microsoft.com/office/drawing/2014/main" id="{85922F25-5B31-AE8B-A9BD-E1420E4CD91B}"/>
+              </a:ext>
+            </a:extLst>
+          </p:cNvPr>
+          <p:cNvSpPr>
+            <a:spLocks noGrp="1"/>
+          </p:cNvSpPr>
+          <p:nvPr>
+            <p:ph type="title"/>
+          </p:nvPr>
+        </p:nvSpPr>
+        <p:spPr>
+          <a:xfrm>
+            <a:off x="0" y="2733675"/>
+            <a:ext cx="12192000" cy="457200"/>
+          </a:xfrm>
+        </p:spPr>
+        <p:txBody>
+          <a:bodyPr>
+            <a:normAutofit fontScale="90000"/>
+          </a:bodyPr>
+          <a:lstStyle/>
+          <a:p>
+            <a:r>
+              <a:rPr lang="en-US" dirty="0"/>
+              <a:t>Lets Analyze</a:t>
+            </a:r>
+            <a:endParaRPr lang="en-IN" dirty="0"/>
+          </a:p>
+        </p:txBody>
+      </p:sp>
+    </p:spTree>
+    <p:extLst>
+      <p:ext uri="{BB962C8B-B14F-4D97-AF65-F5344CB8AC3E}">
+        <p14:creationId xmlns:p14="http://schemas.microsoft.com/office/powerpoint/2010/main" val="480305174"/>
+      </p:ext>
+    </p:extLst>
+  </p:cSld>
+  <p:clrMapOvr>
+    <a:masterClrMapping/>
+  </p:clrMapOvr>
+</p:sld>
+</file>
+
+<file path=ppt/slides/slide18.xml><?xml version="1.0" encoding="utf-8"?>
+<p:sld xmlns:a="http://schemas.openxmlformats.org/drawingml/2006/main" xmlns:r="http://schemas.openxmlformats.org/officeDocument/2006/relationships" xmlns:p="http://schemas.openxmlformats.org/presentationml/2006/main">
+  <p:cSld>
+    <p:spTree>
+      <p:nvGrpSpPr>
+        <p:cNvPr id="1" name=""/>
+        <p:cNvGrpSpPr/>
+        <p:nvPr/>
+      </p:nvGrpSpPr>
+      <p:grpSpPr>
+        <a:xfrm>
+          <a:off x="0" y="0"/>
+          <a:ext cx="0" cy="0"/>
+          <a:chOff x="0" y="0"/>
+          <a:chExt cx="0" cy="0"/>
+        </a:xfrm>
+      </p:grpSpPr>
+      <p:sp>
+        <p:nvSpPr>
+          <p:cNvPr id="3" name="Content Placeholder 2">
+            <a:extLst>
+              <a:ext uri="{FF2B5EF4-FFF2-40B4-BE49-F238E27FC236}">
+                <a16:creationId xmlns:a16="http://schemas.microsoft.com/office/drawing/2014/main" id="{8BDCE82B-888C-50B0-B703-E7A7A12E37AC}"/>
+              </a:ext>
+            </a:extLst>
+          </p:cNvPr>
+          <p:cNvSpPr>
+            <a:spLocks noGrp="1"/>
+          </p:cNvSpPr>
+          <p:nvPr>
+            <p:ph idx="1"/>
+          </p:nvPr>
+        </p:nvSpPr>
+        <p:spPr>
+          <a:xfrm>
+            <a:off x="0" y="1"/>
+            <a:ext cx="12192000" cy="6858000"/>
+          </a:xfrm>
+        </p:spPr>
+        <p:txBody>
+          <a:bodyPr/>
+          <a:lstStyle/>
+          <a:p>
+            <a:r>
+              <a:rPr lang="en-US" dirty="0"/>
+              <a:t>Faster go to market with a Minimal Viable Product to start exploring if they are on correct track</a:t>
+            </a:r>
+          </a:p>
+          <a:p>
+            <a:pPr lvl="1"/>
+            <a:r>
+              <a:rPr lang="en-IN" dirty="0"/>
+              <a:t>Faster GTM means adoption of the low code – no code tools and services, so we select Power Platform. Since we have selected power platform, we choose Azure as the Cloud Service Provider due to the synergy between Power Platform and Azure</a:t>
+            </a:r>
+          </a:p>
+          <a:p>
+            <a:r>
+              <a:rPr lang="en-US" dirty="0"/>
+              <a:t>Implement a Guided Underwriting Process for the Underwriters</a:t>
+            </a:r>
+          </a:p>
+          <a:p>
+            <a:pPr lvl="1"/>
+            <a:r>
+              <a:rPr lang="en-US" dirty="0"/>
+              <a:t> Implement Model Driven apps with business process flow for guided experience.  </a:t>
+            </a:r>
+          </a:p>
+          <a:p>
+            <a:pPr lvl="1"/>
+            <a:r>
+              <a:rPr lang="en-US" dirty="0"/>
+              <a:t>Implement approvals, meeting creations, contextual chats, </a:t>
+            </a:r>
+            <a:r>
+              <a:rPr lang="en-US" dirty="0" err="1"/>
+              <a:t>Dataverse</a:t>
+            </a:r>
+            <a:r>
+              <a:rPr lang="en-US" dirty="0"/>
+              <a:t> updates etc. with other team members using Power Automate as it has high cohesion with M365  and Power Platform products</a:t>
+            </a:r>
+          </a:p>
+          <a:p>
+            <a:pPr lvl="1"/>
+            <a:endParaRPr lang="en-IN" dirty="0"/>
+          </a:p>
+          <a:p>
+            <a:r>
+              <a:rPr lang="en-US" dirty="0"/>
+              <a:t>Implement a Guided Loans Origination Process for the Loans Officers</a:t>
+            </a:r>
+          </a:p>
+          <a:p>
+            <a:pPr lvl="1"/>
+            <a:r>
+              <a:rPr lang="en-IN" dirty="0"/>
+              <a:t> Implement the business process flow (Power Automate) and embed in a model driven apps which the loans officer can use</a:t>
+            </a:r>
+          </a:p>
+          <a:p>
+            <a:pPr lvl="1"/>
+            <a:r>
+              <a:rPr lang="en-IN" dirty="0"/>
+              <a:t>On passing of the loan, the loan needs to sync back to the Originations System. Since it exposes API, and such APIs can be reused in other places and might need complex mapping and transformation logic, Create Logic Apps as the façade/ orchestrators on top of the Originations system and secure them through APIM. Call the Logic Apps through Power Automate Flows embedded in Model Driven Apps</a:t>
+            </a:r>
+          </a:p>
+          <a:p>
+            <a:pPr lvl="1"/>
+            <a:r>
+              <a:rPr lang="en-IN" dirty="0"/>
+              <a:t>Create a Desktop flow to sync the customer information into the legacy Customer Information System</a:t>
+            </a:r>
+          </a:p>
+          <a:p>
+            <a:pPr marL="457200" lvl="1" indent="0">
+              <a:buNone/>
+            </a:pPr>
+            <a:endParaRPr lang="en-US" dirty="0"/>
+          </a:p>
+          <a:p>
+            <a:pPr lvl="1"/>
+            <a:endParaRPr lang="en-US" dirty="0"/>
+          </a:p>
+          <a:p>
+            <a:pPr lvl="1"/>
+            <a:endParaRPr lang="en-US" dirty="0"/>
+          </a:p>
+          <a:p>
+            <a:pPr marL="0" indent="0">
+              <a:buNone/>
+            </a:pPr>
+            <a:endParaRPr lang="en-US" dirty="0"/>
+          </a:p>
+          <a:p>
+            <a:endParaRPr lang="en-IN" dirty="0"/>
+          </a:p>
+          <a:p>
+            <a:pPr marL="0" indent="0">
+              <a:buNone/>
+            </a:pPr>
+            <a:endParaRPr lang="en-IN" dirty="0"/>
+          </a:p>
+          <a:p>
+            <a:endParaRPr lang="en-IN" dirty="0"/>
+          </a:p>
+        </p:txBody>
+      </p:sp>
+    </p:spTree>
+    <p:extLst>
+      <p:ext uri="{BB962C8B-B14F-4D97-AF65-F5344CB8AC3E}">
+        <p14:creationId xmlns:p14="http://schemas.microsoft.com/office/powerpoint/2010/main" val="24714421"/>
+      </p:ext>
+    </p:extLst>
+  </p:cSld>
+  <p:clrMapOvr>
+    <a:masterClrMapping/>
+  </p:clrMapOvr>
+  <p:timing>
+    <p:tnLst>
+      <p:par>
+        <p:cTn id="1" dur="indefinite" restart="never" nodeType="tmRoot">
+          <p:childTnLst>
+            <p:seq concurrent="1" nextAc="seek">
+              <p:cTn id="2" dur="indefinite" nodeType="mainSeq">
+                <p:childTnLst>
+                  <p:par>
+                    <p:cTn id="3" fill="hold">
+                      <p:stCondLst>
+                        <p:cond delay="indefinite"/>
+                      </p:stCondLst>
+                      <p:childTnLst>
+                        <p:par>
+                          <p:cTn id="4" fill="hold">
+                            <p:stCondLst>
+                              <p:cond delay="0"/>
+                            </p:stCondLst>
+                            <p:childTnLst>
+                              <p:par>
+                                <p:cTn id="5" presetID="42" presetClass="entr" presetSubtype="0" fill="hold" grpId="0" nodeType="clickEffect">
+                                  <p:stCondLst>
+                                    <p:cond delay="0"/>
+                                  </p:stCondLst>
+                                  <p:childTnLst>
+                                    <p:set>
+                                      <p:cBhvr>
+                                        <p:cTn id="6" dur="1" fill="hold">
+                                          <p:stCondLst>
+                                            <p:cond delay="0"/>
+                                          </p:stCondLst>
+                                        </p:cTn>
+                                        <p:tgtEl>
+                                          <p:spTgt spid="3">
+                                            <p:txEl>
+                                              <p:pRg st="0" end="0"/>
+                                            </p:txEl>
+                                          </p:spTgt>
+                                        </p:tgtEl>
+                                        <p:attrNameLst>
+                                          <p:attrName>style.visibility</p:attrName>
+                                        </p:attrNameLst>
+                                      </p:cBhvr>
+                                      <p:to>
+                                        <p:strVal val="visible"/>
+                                      </p:to>
+                                    </p:set>
+                                    <p:animEffect transition="in" filter="fade">
+                                      <p:cBhvr>
+                                        <p:cTn id="7" dur="1000"/>
+                                        <p:tgtEl>
+                                          <p:spTgt spid="3">
+                                            <p:txEl>
+                                              <p:pRg st="0" end="0"/>
+                                            </p:txEl>
+                                          </p:spTgt>
+                                        </p:tgtEl>
+                                      </p:cBhvr>
+                                    </p:animEffect>
+                                    <p:anim calcmode="lin" valueType="num">
+                                      <p:cBhvr>
+                                        <p:cTn id="8" dur="1000" fill="hold"/>
+                                        <p:tgtEl>
+                                          <p:spTgt spid="3">
+                                            <p:txEl>
+                                              <p:pRg st="0" end="0"/>
+                                            </p:txEl>
+                                          </p:spTgt>
+                                        </p:tgtEl>
+                                        <p:attrNameLst>
+                                          <p:attrName>ppt_x</p:attrName>
+                                        </p:attrNameLst>
+                                      </p:cBhvr>
+                                      <p:tavLst>
+                                        <p:tav tm="0">
+                                          <p:val>
+                                            <p:strVal val="#ppt_x"/>
+                                          </p:val>
+                                        </p:tav>
+                                        <p:tav tm="100000">
+                                          <p:val>
+                                            <p:strVal val="#ppt_x"/>
+                                          </p:val>
+                                        </p:tav>
+                                      </p:tavLst>
+                                    </p:anim>
+                                    <p:anim calcmode="lin" valueType="num">
+                                      <p:cBhvr>
+                                        <p:cTn id="9" dur="1000" fill="hold"/>
+                                        <p:tgtEl>
+                                          <p:spTgt spid="3">
+                                            <p:txEl>
+                                              <p:pRg st="0" end="0"/>
+                                            </p:txEl>
+                                          </p:spTgt>
+                                        </p:tgtEl>
+                                        <p:attrNameLst>
+                                          <p:attrName>ppt_y</p:attrName>
+                                        </p:attrNameLst>
+                                      </p:cBhvr>
+                                      <p:tavLst>
+                                        <p:tav tm="0">
+                                          <p:val>
+                                            <p:strVal val="#ppt_y+.1"/>
+                                          </p:val>
+                                        </p:tav>
+                                        <p:tav tm="100000">
+                                          <p:val>
+                                            <p:strVal val="#ppt_y"/>
+                                          </p:val>
+                                        </p:tav>
+                                      </p:tavLst>
+                                    </p:anim>
+                                  </p:childTnLst>
+                                </p:cTn>
+                              </p:par>
+                              <p:par>
+                                <p:cTn id="10" presetID="42" presetClass="entr" presetSubtype="0" fill="hold" grpId="0" nodeType="withEffect">
+                                  <p:stCondLst>
+                                    <p:cond delay="0"/>
+                                  </p:stCondLst>
+                                  <p:childTnLst>
+                                    <p:set>
+                                      <p:cBhvr>
+                                        <p:cTn id="11" dur="1" fill="hold">
+                                          <p:stCondLst>
+                                            <p:cond delay="0"/>
+                                          </p:stCondLst>
+                                        </p:cTn>
+                                        <p:tgtEl>
+                                          <p:spTgt spid="3">
+                                            <p:txEl>
+                                              <p:pRg st="1" end="1"/>
+                                            </p:txEl>
+                                          </p:spTgt>
+                                        </p:tgtEl>
+                                        <p:attrNameLst>
+                                          <p:attrName>style.visibility</p:attrName>
+                                        </p:attrNameLst>
+                                      </p:cBhvr>
+                                      <p:to>
+                                        <p:strVal val="visible"/>
+                                      </p:to>
+                                    </p:set>
+                                    <p:animEffect transition="in" filter="fade">
+                                      <p:cBhvr>
+                                        <p:cTn id="12" dur="1000"/>
+                                        <p:tgtEl>
+                                          <p:spTgt spid="3">
+                                            <p:txEl>
+                                              <p:pRg st="1" end="1"/>
+                                            </p:txEl>
+                                          </p:spTgt>
+                                        </p:tgtEl>
+                                      </p:cBhvr>
+                                    </p:animEffect>
+                                    <p:anim calcmode="lin" valueType="num">
+                                      <p:cBhvr>
+                                        <p:cTn id="13" dur="1000" fill="hold"/>
+                                        <p:tgtEl>
+                                          <p:spTgt spid="3">
+                                            <p:txEl>
+                                              <p:pRg st="1" end="1"/>
+                                            </p:txEl>
+                                          </p:spTgt>
+                                        </p:tgtEl>
+                                        <p:attrNameLst>
+                                          <p:attrName>ppt_x</p:attrName>
+                                        </p:attrNameLst>
+                                      </p:cBhvr>
+                                      <p:tavLst>
+                                        <p:tav tm="0">
+                                          <p:val>
+                                            <p:strVal val="#ppt_x"/>
+                                          </p:val>
+                                        </p:tav>
+                                        <p:tav tm="100000">
+                                          <p:val>
+                                            <p:strVal val="#ppt_x"/>
+                                          </p:val>
+                                        </p:tav>
+                                      </p:tavLst>
+                                    </p:anim>
+                                    <p:anim calcmode="lin" valueType="num">
+                                      <p:cBhvr>
+                                        <p:cTn id="14" dur="1000" fill="hold"/>
+                                        <p:tgtEl>
+                                          <p:spTgt spid="3">
+                                            <p:txEl>
+                                              <p:pRg st="1" end="1"/>
+                                            </p:txEl>
+                                          </p:spTgt>
+                                        </p:tgtEl>
+                                        <p:attrNameLst>
+                                          <p:attrName>ppt_y</p:attrName>
+                                        </p:attrNameLst>
+                                      </p:cBhvr>
+                                      <p:tavLst>
+                                        <p:tav tm="0">
+                                          <p:val>
+                                            <p:strVal val="#ppt_y+.1"/>
+                                          </p:val>
+                                        </p:tav>
+                                        <p:tav tm="100000">
+                                          <p:val>
+                                            <p:strVal val="#ppt_y"/>
+                                          </p:val>
+                                        </p:tav>
+                                      </p:tavLst>
+                                    </p:anim>
+                                  </p:childTnLst>
+                                </p:cTn>
+                              </p:par>
+                            </p:childTnLst>
+                          </p:cTn>
+                        </p:par>
+                      </p:childTnLst>
+                    </p:cTn>
+                  </p:par>
+                  <p:par>
+                    <p:cTn id="15" fill="hold">
+                      <p:stCondLst>
+                        <p:cond delay="indefinite"/>
+                      </p:stCondLst>
+                      <p:childTnLst>
+                        <p:par>
+                          <p:cTn id="16" fill="hold">
+                            <p:stCondLst>
+                              <p:cond delay="0"/>
+                            </p:stCondLst>
+                            <p:childTnLst>
+                              <p:par>
+                                <p:cTn id="17" presetID="42" presetClass="entr" presetSubtype="0" fill="hold" grpId="0" nodeType="clickEffect">
+                                  <p:stCondLst>
+                                    <p:cond delay="0"/>
+                                  </p:stCondLst>
+                                  <p:childTnLst>
+                                    <p:set>
+                                      <p:cBhvr>
+                                        <p:cTn id="18" dur="1" fill="hold">
+                                          <p:stCondLst>
+                                            <p:cond delay="0"/>
+                                          </p:stCondLst>
+                                        </p:cTn>
+                                        <p:tgtEl>
+                                          <p:spTgt spid="3">
+                                            <p:txEl>
+                                              <p:pRg st="2" end="2"/>
+                                            </p:txEl>
+                                          </p:spTgt>
+                                        </p:tgtEl>
+                                        <p:attrNameLst>
+                                          <p:attrName>style.visibility</p:attrName>
+                                        </p:attrNameLst>
+                                      </p:cBhvr>
+                                      <p:to>
+                                        <p:strVal val="visible"/>
+                                      </p:to>
+                                    </p:set>
+                                    <p:animEffect transition="in" filter="fade">
+                                      <p:cBhvr>
+                                        <p:cTn id="19" dur="1000"/>
+                                        <p:tgtEl>
+                                          <p:spTgt spid="3">
+                                            <p:txEl>
+                                              <p:pRg st="2" end="2"/>
+                                            </p:txEl>
+                                          </p:spTgt>
+                                        </p:tgtEl>
+                                      </p:cBhvr>
+                                    </p:animEffect>
+                                    <p:anim calcmode="lin" valueType="num">
+                                      <p:cBhvr>
+                                        <p:cTn id="20" dur="1000" fill="hold"/>
+                                        <p:tgtEl>
+                                          <p:spTgt spid="3">
+                                            <p:txEl>
+                                              <p:pRg st="2" end="2"/>
+                                            </p:txEl>
+                                          </p:spTgt>
+                                        </p:tgtEl>
+                                        <p:attrNameLst>
+                                          <p:attrName>ppt_x</p:attrName>
+                                        </p:attrNameLst>
+                                      </p:cBhvr>
+                                      <p:tavLst>
+                                        <p:tav tm="0">
+                                          <p:val>
+                                            <p:strVal val="#ppt_x"/>
+                                          </p:val>
+                                        </p:tav>
+                                        <p:tav tm="100000">
+                                          <p:val>
+                                            <p:strVal val="#ppt_x"/>
+                                          </p:val>
+                                        </p:tav>
+                                      </p:tavLst>
+                                    </p:anim>
+                                    <p:anim calcmode="lin" valueType="num">
+                                      <p:cBhvr>
+                                        <p:cTn id="21" dur="1000" fill="hold"/>
+                                        <p:tgtEl>
+                                          <p:spTgt spid="3">
+                                            <p:txEl>
+                                              <p:pRg st="2" end="2"/>
+                                            </p:txEl>
+                                          </p:spTgt>
+                                        </p:tgtEl>
+                                        <p:attrNameLst>
+                                          <p:attrName>ppt_y</p:attrName>
+                                        </p:attrNameLst>
+                                      </p:cBhvr>
+                                      <p:tavLst>
+                                        <p:tav tm="0">
+                                          <p:val>
+                                            <p:strVal val="#ppt_y+.1"/>
+                                          </p:val>
+                                        </p:tav>
+                                        <p:tav tm="100000">
+                                          <p:val>
+                                            <p:strVal val="#ppt_y"/>
+                                          </p:val>
+                                        </p:tav>
+                                      </p:tavLst>
+                                    </p:anim>
+                                  </p:childTnLst>
+                                </p:cTn>
+                              </p:par>
+                              <p:par>
+                                <p:cTn id="22" presetID="42" presetClass="entr" presetSubtype="0" fill="hold" grpId="0" nodeType="withEffect">
+                                  <p:stCondLst>
+                                    <p:cond delay="0"/>
+                                  </p:stCondLst>
+                                  <p:childTnLst>
+                                    <p:set>
+                                      <p:cBhvr>
+                                        <p:cTn id="23" dur="1" fill="hold">
+                                          <p:stCondLst>
+                                            <p:cond delay="0"/>
+                                          </p:stCondLst>
+                                        </p:cTn>
+                                        <p:tgtEl>
+                                          <p:spTgt spid="3">
+                                            <p:txEl>
+                                              <p:pRg st="3" end="3"/>
+                                            </p:txEl>
+                                          </p:spTgt>
+                                        </p:tgtEl>
+                                        <p:attrNameLst>
+                                          <p:attrName>style.visibility</p:attrName>
+                                        </p:attrNameLst>
+                                      </p:cBhvr>
+                                      <p:to>
+                                        <p:strVal val="visible"/>
+                                      </p:to>
+                                    </p:set>
+                                    <p:animEffect transition="in" filter="fade">
+                                      <p:cBhvr>
+                                        <p:cTn id="24" dur="1000"/>
+                                        <p:tgtEl>
+                                          <p:spTgt spid="3">
+                                            <p:txEl>
+                                              <p:pRg st="3" end="3"/>
+                                            </p:txEl>
+                                          </p:spTgt>
+                                        </p:tgtEl>
+                                      </p:cBhvr>
+                                    </p:animEffect>
+                                    <p:anim calcmode="lin" valueType="num">
+                                      <p:cBhvr>
+                                        <p:cTn id="25" dur="1000" fill="hold"/>
+                                        <p:tgtEl>
+                                          <p:spTgt spid="3">
+                                            <p:txEl>
+                                              <p:pRg st="3" end="3"/>
+                                            </p:txEl>
+                                          </p:spTgt>
+                                        </p:tgtEl>
+                                        <p:attrNameLst>
+                                          <p:attrName>ppt_x</p:attrName>
+                                        </p:attrNameLst>
+                                      </p:cBhvr>
+                                      <p:tavLst>
+                                        <p:tav tm="0">
+                                          <p:val>
+                                            <p:strVal val="#ppt_x"/>
+                                          </p:val>
+                                        </p:tav>
+                                        <p:tav tm="100000">
+                                          <p:val>
+                                            <p:strVal val="#ppt_x"/>
+                                          </p:val>
+                                        </p:tav>
+                                      </p:tavLst>
+                                    </p:anim>
+                                    <p:anim calcmode="lin" valueType="num">
+                                      <p:cBhvr>
+                                        <p:cTn id="26" dur="1000" fill="hold"/>
+                                        <p:tgtEl>
+                                          <p:spTgt spid="3">
+                                            <p:txEl>
+                                              <p:pRg st="3" end="3"/>
+                                            </p:txEl>
+                                          </p:spTgt>
+                                        </p:tgtEl>
+                                        <p:attrNameLst>
+                                          <p:attrName>ppt_y</p:attrName>
+                                        </p:attrNameLst>
+                                      </p:cBhvr>
+                                      <p:tavLst>
+                                        <p:tav tm="0">
+                                          <p:val>
+                                            <p:strVal val="#ppt_y+.1"/>
+                                          </p:val>
+                                        </p:tav>
+                                        <p:tav tm="100000">
+                                          <p:val>
+                                            <p:strVal val="#ppt_y"/>
+                                          </p:val>
+                                        </p:tav>
+                                      </p:tavLst>
+                                    </p:anim>
+                                  </p:childTnLst>
+                                </p:cTn>
+                              </p:par>
+                              <p:par>
+                                <p:cTn id="27" presetID="42" presetClass="entr" presetSubtype="0" fill="hold" grpId="0" nodeType="withEffect">
+                                  <p:stCondLst>
+                                    <p:cond delay="0"/>
+                                  </p:stCondLst>
+                                  <p:childTnLst>
+                                    <p:set>
+                                      <p:cBhvr>
+                                        <p:cTn id="28" dur="1" fill="hold">
+                                          <p:stCondLst>
+                                            <p:cond delay="0"/>
+                                          </p:stCondLst>
+                                        </p:cTn>
+                                        <p:tgtEl>
+                                          <p:spTgt spid="3">
+                                            <p:txEl>
+                                              <p:pRg st="4" end="4"/>
+                                            </p:txEl>
+                                          </p:spTgt>
+                                        </p:tgtEl>
+                                        <p:attrNameLst>
+                                          <p:attrName>style.visibility</p:attrName>
+                                        </p:attrNameLst>
+                                      </p:cBhvr>
+                                      <p:to>
+                                        <p:strVal val="visible"/>
+                                      </p:to>
+                                    </p:set>
+                                    <p:animEffect transition="in" filter="fade">
+                                      <p:cBhvr>
+                                        <p:cTn id="29" dur="1000"/>
+                                        <p:tgtEl>
+                                          <p:spTgt spid="3">
+                                            <p:txEl>
+                                              <p:pRg st="4" end="4"/>
+                                            </p:txEl>
+                                          </p:spTgt>
+                                        </p:tgtEl>
+                                      </p:cBhvr>
+                                    </p:animEffect>
+                                    <p:anim calcmode="lin" valueType="num">
+                                      <p:cBhvr>
+                                        <p:cTn id="30" dur="1000" fill="hold"/>
+                                        <p:tgtEl>
+                                          <p:spTgt spid="3">
+                                            <p:txEl>
+                                              <p:pRg st="4" end="4"/>
+                                            </p:txEl>
+                                          </p:spTgt>
+                                        </p:tgtEl>
+                                        <p:attrNameLst>
+                                          <p:attrName>ppt_x</p:attrName>
+                                        </p:attrNameLst>
+                                      </p:cBhvr>
+                                      <p:tavLst>
+                                        <p:tav tm="0">
+                                          <p:val>
+                                            <p:strVal val="#ppt_x"/>
+                                          </p:val>
+                                        </p:tav>
+                                        <p:tav tm="100000">
+                                          <p:val>
+                                            <p:strVal val="#ppt_x"/>
+                                          </p:val>
+                                        </p:tav>
+                                      </p:tavLst>
+                                    </p:anim>
+                                    <p:anim calcmode="lin" valueType="num">
+                                      <p:cBhvr>
+                                        <p:cTn id="31" dur="1000" fill="hold"/>
+                                        <p:tgtEl>
+                                          <p:spTgt spid="3">
+                                            <p:txEl>
+                                              <p:pRg st="4" end="4"/>
+                                            </p:txEl>
+                                          </p:spTgt>
+                                        </p:tgtEl>
+                                        <p:attrNameLst>
+                                          <p:attrName>ppt_y</p:attrName>
+                                        </p:attrNameLst>
+                                      </p:cBhvr>
+                                      <p:tavLst>
+                                        <p:tav tm="0">
+                                          <p:val>
+                                            <p:strVal val="#ppt_y+.1"/>
+                                          </p:val>
+                                        </p:tav>
+                                        <p:tav tm="100000">
+                                          <p:val>
+                                            <p:strVal val="#ppt_y"/>
+                                          </p:val>
+                                        </p:tav>
+                                      </p:tavLst>
+                                    </p:anim>
+                                  </p:childTnLst>
+                                </p:cTn>
+                              </p:par>
+                            </p:childTnLst>
+                          </p:cTn>
+                        </p:par>
+                      </p:childTnLst>
+                    </p:cTn>
+                  </p:par>
+                  <p:par>
+                    <p:cTn id="32" fill="hold">
+                      <p:stCondLst>
+                        <p:cond delay="indefinite"/>
+                      </p:stCondLst>
+                      <p:childTnLst>
+                        <p:par>
+                          <p:cTn id="33" fill="hold">
+                            <p:stCondLst>
+                              <p:cond delay="0"/>
+                            </p:stCondLst>
+                            <p:childTnLst>
+                              <p:par>
+                                <p:cTn id="34" presetID="42" presetClass="entr" presetSubtype="0" fill="hold" grpId="0" nodeType="clickEffect">
+                                  <p:stCondLst>
+                                    <p:cond delay="0"/>
+                                  </p:stCondLst>
+                                  <p:childTnLst>
+                                    <p:set>
+                                      <p:cBhvr>
+                                        <p:cTn id="35" dur="1" fill="hold">
+                                          <p:stCondLst>
+                                            <p:cond delay="0"/>
+                                          </p:stCondLst>
+                                        </p:cTn>
+                                        <p:tgtEl>
+                                          <p:spTgt spid="3">
+                                            <p:txEl>
+                                              <p:pRg st="6" end="6"/>
+                                            </p:txEl>
+                                          </p:spTgt>
+                                        </p:tgtEl>
+                                        <p:attrNameLst>
+                                          <p:attrName>style.visibility</p:attrName>
+                                        </p:attrNameLst>
+                                      </p:cBhvr>
+                                      <p:to>
+                                        <p:strVal val="visible"/>
+                                      </p:to>
+                                    </p:set>
+                                    <p:animEffect transition="in" filter="fade">
+                                      <p:cBhvr>
+                                        <p:cTn id="36" dur="1000"/>
+                                        <p:tgtEl>
+                                          <p:spTgt spid="3">
+                                            <p:txEl>
+                                              <p:pRg st="6" end="6"/>
+                                            </p:txEl>
+                                          </p:spTgt>
+                                        </p:tgtEl>
+                                      </p:cBhvr>
+                                    </p:animEffect>
+                                    <p:anim calcmode="lin" valueType="num">
+                                      <p:cBhvr>
+                                        <p:cTn id="37" dur="1000" fill="hold"/>
+                                        <p:tgtEl>
+                                          <p:spTgt spid="3">
+                                            <p:txEl>
+                                              <p:pRg st="6" end="6"/>
+                                            </p:txEl>
+                                          </p:spTgt>
+                                        </p:tgtEl>
+                                        <p:attrNameLst>
+                                          <p:attrName>ppt_x</p:attrName>
+                                        </p:attrNameLst>
+                                      </p:cBhvr>
+                                      <p:tavLst>
+                                        <p:tav tm="0">
+                                          <p:val>
+                                            <p:strVal val="#ppt_x"/>
+                                          </p:val>
+                                        </p:tav>
+                                        <p:tav tm="100000">
+                                          <p:val>
+                                            <p:strVal val="#ppt_x"/>
+                                          </p:val>
+                                        </p:tav>
+                                      </p:tavLst>
+                                    </p:anim>
+                                    <p:anim calcmode="lin" valueType="num">
+                                      <p:cBhvr>
+                                        <p:cTn id="38" dur="1000" fill="hold"/>
+                                        <p:tgtEl>
+                                          <p:spTgt spid="3">
+                                            <p:txEl>
+                                              <p:pRg st="6" end="6"/>
+                                            </p:txEl>
+                                          </p:spTgt>
+                                        </p:tgtEl>
+                                        <p:attrNameLst>
+                                          <p:attrName>ppt_y</p:attrName>
+                                        </p:attrNameLst>
+                                      </p:cBhvr>
+                                      <p:tavLst>
+                                        <p:tav tm="0">
+                                          <p:val>
+                                            <p:strVal val="#ppt_y+.1"/>
+                                          </p:val>
+                                        </p:tav>
+                                        <p:tav tm="100000">
+                                          <p:val>
+                                            <p:strVal val="#ppt_y"/>
+                                          </p:val>
+                                        </p:tav>
+                                      </p:tavLst>
+                                    </p:anim>
+                                  </p:childTnLst>
+                                </p:cTn>
+                              </p:par>
+                              <p:par>
+                                <p:cTn id="39" presetID="42" presetClass="entr" presetSubtype="0" fill="hold" grpId="0" nodeType="withEffect">
+                                  <p:stCondLst>
+                                    <p:cond delay="0"/>
+                                  </p:stCondLst>
+                                  <p:childTnLst>
+                                    <p:set>
+                                      <p:cBhvr>
+                                        <p:cTn id="40" dur="1" fill="hold">
+                                          <p:stCondLst>
+                                            <p:cond delay="0"/>
+                                          </p:stCondLst>
+                                        </p:cTn>
+                                        <p:tgtEl>
+                                          <p:spTgt spid="3">
+                                            <p:txEl>
+                                              <p:pRg st="7" end="7"/>
+                                            </p:txEl>
+                                          </p:spTgt>
+                                        </p:tgtEl>
+                                        <p:attrNameLst>
+                                          <p:attrName>style.visibility</p:attrName>
+                                        </p:attrNameLst>
+                                      </p:cBhvr>
+                                      <p:to>
+                                        <p:strVal val="visible"/>
+                                      </p:to>
+                                    </p:set>
+                                    <p:animEffect transition="in" filter="fade">
+                                      <p:cBhvr>
+                                        <p:cTn id="41" dur="1000"/>
+                                        <p:tgtEl>
+                                          <p:spTgt spid="3">
+                                            <p:txEl>
+                                              <p:pRg st="7" end="7"/>
+                                            </p:txEl>
+                                          </p:spTgt>
+                                        </p:tgtEl>
+                                      </p:cBhvr>
+                                    </p:animEffect>
+                                    <p:anim calcmode="lin" valueType="num">
+                                      <p:cBhvr>
+                                        <p:cTn id="42" dur="1000" fill="hold"/>
+                                        <p:tgtEl>
+                                          <p:spTgt spid="3">
+                                            <p:txEl>
+                                              <p:pRg st="7" end="7"/>
+                                            </p:txEl>
+                                          </p:spTgt>
+                                        </p:tgtEl>
+                                        <p:attrNameLst>
+                                          <p:attrName>ppt_x</p:attrName>
+                                        </p:attrNameLst>
+                                      </p:cBhvr>
+                                      <p:tavLst>
+                                        <p:tav tm="0">
+                                          <p:val>
+                                            <p:strVal val="#ppt_x"/>
+                                          </p:val>
+                                        </p:tav>
+                                        <p:tav tm="100000">
+                                          <p:val>
+                                            <p:strVal val="#ppt_x"/>
+                                          </p:val>
+                                        </p:tav>
+                                      </p:tavLst>
+                                    </p:anim>
+                                    <p:anim calcmode="lin" valueType="num">
+                                      <p:cBhvr>
+                                        <p:cTn id="43" dur="1000" fill="hold"/>
+                                        <p:tgtEl>
+                                          <p:spTgt spid="3">
+                                            <p:txEl>
+                                              <p:pRg st="7" end="7"/>
+                                            </p:txEl>
+                                          </p:spTgt>
+                                        </p:tgtEl>
+                                        <p:attrNameLst>
+                                          <p:attrName>ppt_y</p:attrName>
+                                        </p:attrNameLst>
+                                      </p:cBhvr>
+                                      <p:tavLst>
+                                        <p:tav tm="0">
+                                          <p:val>
+                                            <p:strVal val="#ppt_y+.1"/>
+                                          </p:val>
+                                        </p:tav>
+                                        <p:tav tm="100000">
+                                          <p:val>
+                                            <p:strVal val="#ppt_y"/>
+                                          </p:val>
+                                        </p:tav>
+                                      </p:tavLst>
+                                    </p:anim>
+                                  </p:childTnLst>
+                                </p:cTn>
+                              </p:par>
+                              <p:par>
+                                <p:cTn id="44" presetID="42" presetClass="entr" presetSubtype="0" fill="hold" grpId="0" nodeType="withEffect">
+                                  <p:stCondLst>
+                                    <p:cond delay="0"/>
+                                  </p:stCondLst>
+                                  <p:childTnLst>
+                                    <p:set>
+                                      <p:cBhvr>
+                                        <p:cTn id="45" dur="1" fill="hold">
+                                          <p:stCondLst>
+                                            <p:cond delay="0"/>
+                                          </p:stCondLst>
+                                        </p:cTn>
+                                        <p:tgtEl>
+                                          <p:spTgt spid="3">
+                                            <p:txEl>
+                                              <p:pRg st="8" end="8"/>
+                                            </p:txEl>
+                                          </p:spTgt>
+                                        </p:tgtEl>
+                                        <p:attrNameLst>
+                                          <p:attrName>style.visibility</p:attrName>
+                                        </p:attrNameLst>
+                                      </p:cBhvr>
+                                      <p:to>
+                                        <p:strVal val="visible"/>
+                                      </p:to>
+                                    </p:set>
+                                    <p:animEffect transition="in" filter="fade">
+                                      <p:cBhvr>
+                                        <p:cTn id="46" dur="1000"/>
+                                        <p:tgtEl>
+                                          <p:spTgt spid="3">
+                                            <p:txEl>
+                                              <p:pRg st="8" end="8"/>
+                                            </p:txEl>
+                                          </p:spTgt>
+                                        </p:tgtEl>
+                                      </p:cBhvr>
+                                    </p:animEffect>
+                                    <p:anim calcmode="lin" valueType="num">
+                                      <p:cBhvr>
+                                        <p:cTn id="47" dur="1000" fill="hold"/>
+                                        <p:tgtEl>
+                                          <p:spTgt spid="3">
+                                            <p:txEl>
+                                              <p:pRg st="8" end="8"/>
+                                            </p:txEl>
+                                          </p:spTgt>
+                                        </p:tgtEl>
+                                        <p:attrNameLst>
+                                          <p:attrName>ppt_x</p:attrName>
+                                        </p:attrNameLst>
+                                      </p:cBhvr>
+                                      <p:tavLst>
+                                        <p:tav tm="0">
+                                          <p:val>
+                                            <p:strVal val="#ppt_x"/>
+                                          </p:val>
+                                        </p:tav>
+                                        <p:tav tm="100000">
+                                          <p:val>
+                                            <p:strVal val="#ppt_x"/>
+                                          </p:val>
+                                        </p:tav>
+                                      </p:tavLst>
+                                    </p:anim>
+                                    <p:anim calcmode="lin" valueType="num">
+                                      <p:cBhvr>
+                                        <p:cTn id="48" dur="1000" fill="hold"/>
+                                        <p:tgtEl>
+                                          <p:spTgt spid="3">
+                                            <p:txEl>
+                                              <p:pRg st="8" end="8"/>
+                                            </p:txEl>
+                                          </p:spTgt>
+                                        </p:tgtEl>
+                                        <p:attrNameLst>
+                                          <p:attrName>ppt_y</p:attrName>
+                                        </p:attrNameLst>
+                                      </p:cBhvr>
+                                      <p:tavLst>
+                                        <p:tav tm="0">
+                                          <p:val>
+                                            <p:strVal val="#ppt_y+.1"/>
+                                          </p:val>
+                                        </p:tav>
+                                        <p:tav tm="100000">
+                                          <p:val>
+                                            <p:strVal val="#ppt_y"/>
+                                          </p:val>
+                                        </p:tav>
+                                      </p:tavLst>
+                                    </p:anim>
+                                  </p:childTnLst>
+                                </p:cTn>
+                              </p:par>
+                              <p:par>
+                                <p:cTn id="49" presetID="42" presetClass="entr" presetSubtype="0" fill="hold" grpId="0" nodeType="withEffect">
+                                  <p:stCondLst>
+                                    <p:cond delay="0"/>
+                                  </p:stCondLst>
+                                  <p:childTnLst>
+                                    <p:set>
+                                      <p:cBhvr>
+                                        <p:cTn id="50" dur="1" fill="hold">
+                                          <p:stCondLst>
+                                            <p:cond delay="0"/>
+                                          </p:stCondLst>
+                                        </p:cTn>
+                                        <p:tgtEl>
+                                          <p:spTgt spid="3">
+                                            <p:txEl>
+                                              <p:pRg st="9" end="9"/>
+                                            </p:txEl>
+                                          </p:spTgt>
+                                        </p:tgtEl>
+                                        <p:attrNameLst>
+                                          <p:attrName>style.visibility</p:attrName>
+                                        </p:attrNameLst>
+                                      </p:cBhvr>
+                                      <p:to>
+                                        <p:strVal val="visible"/>
+                                      </p:to>
+                                    </p:set>
+                                    <p:animEffect transition="in" filter="fade">
+                                      <p:cBhvr>
+                                        <p:cTn id="51" dur="1000"/>
+                                        <p:tgtEl>
+                                          <p:spTgt spid="3">
+                                            <p:txEl>
+                                              <p:pRg st="9" end="9"/>
+                                            </p:txEl>
+                                          </p:spTgt>
+                                        </p:tgtEl>
+                                      </p:cBhvr>
+                                    </p:animEffect>
+                                    <p:anim calcmode="lin" valueType="num">
+                                      <p:cBhvr>
+                                        <p:cTn id="52" dur="1000" fill="hold"/>
+                                        <p:tgtEl>
+                                          <p:spTgt spid="3">
+                                            <p:txEl>
+                                              <p:pRg st="9" end="9"/>
+                                            </p:txEl>
+                                          </p:spTgt>
+                                        </p:tgtEl>
+                                        <p:attrNameLst>
+                                          <p:attrName>ppt_x</p:attrName>
+                                        </p:attrNameLst>
+                                      </p:cBhvr>
+                                      <p:tavLst>
+                                        <p:tav tm="0">
+                                          <p:val>
+                                            <p:strVal val="#ppt_x"/>
+                                          </p:val>
+                                        </p:tav>
+                                        <p:tav tm="100000">
+                                          <p:val>
+                                            <p:strVal val="#ppt_x"/>
+                                          </p:val>
+                                        </p:tav>
+                                      </p:tavLst>
+                                    </p:anim>
+                                    <p:anim calcmode="lin" valueType="num">
+                                      <p:cBhvr>
+                                        <p:cTn id="53" dur="1000" fill="hold"/>
+                                        <p:tgtEl>
+                                          <p:spTgt spid="3">
+                                            <p:txEl>
+                                              <p:pRg st="9" end="9"/>
+                                            </p:txEl>
+                                          </p:spTgt>
+                                        </p:tgtEl>
+                                        <p:attrNameLst>
+                                          <p:attrName>ppt_y</p:attrName>
+                                        </p:attrNameLst>
+                                      </p:cBhvr>
+                                      <p:tavLst>
+                                        <p:tav tm="0">
+                                          <p:val>
+                                            <p:strVal val="#ppt_y+.1"/>
+                                          </p:val>
+                                        </p:tav>
+                                        <p:tav tm="100000">
+                                          <p:val>
+                                            <p:strVal val="#ppt_y"/>
+                                          </p:val>
+                                        </p:tav>
+                                      </p:tavLst>
+                                    </p:anim>
+                                  </p:childTnLst>
+                                </p:cTn>
+                              </p:par>
+                            </p:childTnLst>
+                          </p:cTn>
+                        </p:par>
+                      </p:childTnLst>
+                    </p:cTn>
+                  </p:par>
+                </p:childTnLst>
+              </p:cTn>
+              <p:prevCondLst>
+                <p:cond evt="onPrev" delay="0">
+                  <p:tgtEl>
+                    <p:sldTgt/>
+                  </p:tgtEl>
+                </p:cond>
+              </p:prevCondLst>
+              <p:nextCondLst>
+                <p:cond evt="onNext" delay="0">
+                  <p:tgtEl>
+                    <p:sldTgt/>
+                  </p:tgtEl>
+                </p:cond>
+              </p:nextCondLst>
+            </p:seq>
+          </p:childTnLst>
+        </p:cTn>
+      </p:par>
+    </p:tnLst>
+    <p:bldLst>
+      <p:bldP spid="3" grpId="0" build="p"/>
+    </p:bldLst>
+  </p:timing>
+</p:sld>
+</file>
+
+<file path=ppt/slides/slide19.xml><?xml version="1.0" encoding="utf-8"?>
+<p:sld xmlns:a="http://schemas.openxmlformats.org/drawingml/2006/main" xmlns:r="http://schemas.openxmlformats.org/officeDocument/2006/relationships" xmlns:p="http://schemas.openxmlformats.org/presentationml/2006/main">
+  <p:cSld>
+    <p:spTree>
+      <p:nvGrpSpPr>
+        <p:cNvPr id="1" name=""/>
+        <p:cNvGrpSpPr/>
+        <p:nvPr/>
+      </p:nvGrpSpPr>
+      <p:grpSpPr>
+        <a:xfrm>
+          <a:off x="0" y="0"/>
+          <a:ext cx="0" cy="0"/>
+          <a:chOff x="0" y="0"/>
+          <a:chExt cx="0" cy="0"/>
+        </a:xfrm>
+      </p:grpSpPr>
+      <p:sp>
+        <p:nvSpPr>
+          <p:cNvPr id="2" name="Title 1">
+            <a:extLst>
+              <a:ext uri="{FF2B5EF4-FFF2-40B4-BE49-F238E27FC236}">
+                <a16:creationId xmlns:a16="http://schemas.microsoft.com/office/drawing/2014/main" id="{0B59E48A-854A-EC83-7F97-E2295B436A9A}"/>
+              </a:ext>
+            </a:extLst>
+          </p:cNvPr>
+          <p:cNvSpPr>
+            <a:spLocks noGrp="1"/>
+          </p:cNvSpPr>
+          <p:nvPr>
+            <p:ph type="title"/>
+          </p:nvPr>
+        </p:nvSpPr>
+        <p:spPr>
+          <a:xfrm>
+            <a:off x="0" y="0"/>
+            <a:ext cx="10353761" cy="781050"/>
+          </a:xfrm>
+        </p:spPr>
+        <p:txBody>
+          <a:bodyPr/>
+          <a:lstStyle/>
+          <a:p>
+            <a:pPr algn="l"/>
+            <a:r>
+              <a:rPr lang="en-US" dirty="0"/>
+              <a:t>Conclusion</a:t>
+            </a:r>
+            <a:endParaRPr lang="en-IN" dirty="0"/>
+          </a:p>
+        </p:txBody>
+      </p:sp>
+      <p:sp>
+        <p:nvSpPr>
+          <p:cNvPr id="3" name="Content Placeholder 2">
+            <a:extLst>
+              <a:ext uri="{FF2B5EF4-FFF2-40B4-BE49-F238E27FC236}">
+                <a16:creationId xmlns:a16="http://schemas.microsoft.com/office/drawing/2014/main" id="{26E9A22C-B95E-D9BB-A049-53ED50F2305D}"/>
+              </a:ext>
+            </a:extLst>
+          </p:cNvPr>
+          <p:cNvSpPr>
+            <a:spLocks noGrp="1"/>
+          </p:cNvSpPr>
+          <p:nvPr>
+            <p:ph idx="1"/>
+          </p:nvPr>
+        </p:nvSpPr>
+        <p:spPr>
+          <a:xfrm>
+            <a:off x="0" y="905439"/>
+            <a:ext cx="10353762" cy="3695136"/>
+          </a:xfrm>
+        </p:spPr>
+        <p:txBody>
+          <a:bodyPr/>
+          <a:lstStyle/>
+          <a:p>
+            <a:r>
+              <a:rPr lang="en-US" dirty="0"/>
+              <a:t>There is no straight answer to the question: Power Automate or Logic Apps</a:t>
+            </a:r>
+          </a:p>
+          <a:p>
+            <a:r>
+              <a:rPr lang="en-US" dirty="0"/>
+              <a:t>It depends on the use case and the requirements</a:t>
+            </a:r>
+          </a:p>
+          <a:p>
+            <a:r>
+              <a:rPr lang="en-US" dirty="0"/>
+              <a:t>The organization which chooses the correct tool enable correct set of developers, will most likely succeed</a:t>
+            </a:r>
+          </a:p>
+          <a:p>
+            <a:endParaRPr lang="en-IN" dirty="0"/>
+          </a:p>
+        </p:txBody>
+      </p:sp>
+    </p:spTree>
+    <p:extLst>
+      <p:ext uri="{BB962C8B-B14F-4D97-AF65-F5344CB8AC3E}">
+        <p14:creationId xmlns:p14="http://schemas.microsoft.com/office/powerpoint/2010/main" val="1937139407"/>
       </p:ext>
     </p:extLst>
   </p:cSld>
@@ -8987,6 +10346,428 @@
 </p:sld>
 </file>
 
+<file path=ppt/slides/slide20.xml><?xml version="1.0" encoding="utf-8"?>
+<p:sld xmlns:a="http://schemas.openxmlformats.org/drawingml/2006/main" xmlns:r="http://schemas.openxmlformats.org/officeDocument/2006/relationships" xmlns:p="http://schemas.openxmlformats.org/presentationml/2006/main">
+  <p:cSld>
+    <p:spTree>
+      <p:nvGrpSpPr>
+        <p:cNvPr id="1" name=""/>
+        <p:cNvGrpSpPr/>
+        <p:nvPr/>
+      </p:nvGrpSpPr>
+      <p:grpSpPr>
+        <a:xfrm>
+          <a:off x="0" y="0"/>
+          <a:ext cx="0" cy="0"/>
+          <a:chOff x="0" y="0"/>
+          <a:chExt cx="0" cy="0"/>
+        </a:xfrm>
+      </p:grpSpPr>
+      <p:sp>
+        <p:nvSpPr>
+          <p:cNvPr id="2" name="Title 1">
+            <a:extLst>
+              <a:ext uri="{FF2B5EF4-FFF2-40B4-BE49-F238E27FC236}">
+                <a16:creationId xmlns:a16="http://schemas.microsoft.com/office/drawing/2014/main" id="{FE1D71AE-9850-C7BA-5C32-53D670B0376A}"/>
+              </a:ext>
+            </a:extLst>
+          </p:cNvPr>
+          <p:cNvSpPr>
+            <a:spLocks noGrp="1"/>
+          </p:cNvSpPr>
+          <p:nvPr>
+            <p:ph type="title"/>
+          </p:nvPr>
+        </p:nvSpPr>
+        <p:spPr>
+          <a:xfrm>
+            <a:off x="806218" y="2124635"/>
+            <a:ext cx="4689707" cy="971621"/>
+          </a:xfrm>
+        </p:spPr>
+        <p:txBody>
+          <a:bodyPr/>
+          <a:lstStyle/>
+          <a:p>
+            <a:r>
+              <a:rPr lang="en-US" dirty="0"/>
+              <a:t>Thank You !!!</a:t>
+            </a:r>
+            <a:endParaRPr lang="en-IN" dirty="0"/>
+          </a:p>
+        </p:txBody>
+      </p:sp>
+      <p:pic>
+        <p:nvPicPr>
+          <p:cNvPr id="4" name="Picture 3">
+            <a:extLst>
+              <a:ext uri="{FF2B5EF4-FFF2-40B4-BE49-F238E27FC236}">
+                <a16:creationId xmlns:a16="http://schemas.microsoft.com/office/drawing/2014/main" id="{A7E1A72D-622E-DCDF-31FA-7B2B70AE5783}"/>
+              </a:ext>
+            </a:extLst>
+          </p:cNvPr>
+          <p:cNvPicPr>
+            <a:picLocks noChangeAspect="1"/>
+          </p:cNvPicPr>
+          <p:nvPr/>
+        </p:nvPicPr>
+        <p:blipFill>
+          <a:blip r:embed="rId3">
+            <a:extLst>
+              <a:ext uri="{28A0092B-C50C-407E-A947-70E740481C1C}">
+                <a14:useLocalDpi xmlns:a14="http://schemas.microsoft.com/office/drawing/2010/main" val="0"/>
+              </a:ext>
+            </a:extLst>
+          </a:blip>
+          <a:stretch>
+            <a:fillRect/>
+          </a:stretch>
+        </p:blipFill>
+        <p:spPr>
+          <a:xfrm>
+            <a:off x="10923072" y="6540768"/>
+            <a:ext cx="1268928" cy="317232"/>
+          </a:xfrm>
+          <a:prstGeom prst="rect">
+            <a:avLst/>
+          </a:prstGeom>
+        </p:spPr>
+      </p:pic>
+      <p:grpSp>
+        <p:nvGrpSpPr>
+          <p:cNvPr id="3" name="Group 2">
+            <a:extLst>
+              <a:ext uri="{FF2B5EF4-FFF2-40B4-BE49-F238E27FC236}">
+                <a16:creationId xmlns:a16="http://schemas.microsoft.com/office/drawing/2014/main" id="{0F40710F-95F4-6D66-F41A-B74A114510FD}"/>
+              </a:ext>
+            </a:extLst>
+          </p:cNvPr>
+          <p:cNvGrpSpPr/>
+          <p:nvPr/>
+        </p:nvGrpSpPr>
+        <p:grpSpPr>
+          <a:xfrm>
+            <a:off x="7752108" y="1911040"/>
+            <a:ext cx="3805428" cy="1653912"/>
+            <a:chOff x="7341108" y="3048000"/>
+            <a:chExt cx="3805428" cy="1653912"/>
+          </a:xfrm>
+        </p:grpSpPr>
+        <p:pic>
+          <p:nvPicPr>
+            <p:cNvPr id="5" name="Graphic 4">
+              <a:extLst>
+                <a:ext uri="{FF2B5EF4-FFF2-40B4-BE49-F238E27FC236}">
+                  <a16:creationId xmlns:a16="http://schemas.microsoft.com/office/drawing/2014/main" id="{D286B3FD-279D-8AD0-CE34-CF010AA8D550}"/>
+                </a:ext>
+              </a:extLst>
+            </p:cNvPr>
+            <p:cNvPicPr>
+              <a:picLocks noChangeAspect="1"/>
+            </p:cNvPicPr>
+            <p:nvPr/>
+          </p:nvPicPr>
+          <p:blipFill>
+            <a:blip r:embed="rId4">
+              <a:extLst>
+                <a:ext uri="{28A0092B-C50C-407E-A947-70E740481C1C}">
+                  <a14:useLocalDpi xmlns:a14="http://schemas.microsoft.com/office/drawing/2010/main" val="0"/>
+                </a:ext>
+                <a:ext uri="{96DAC541-7B7A-43D3-8B79-37D633B846F1}">
+                  <asvg:svgBlip xmlns:asvg="http://schemas.microsoft.com/office/drawing/2016/SVG/main" r:embed="rId5"/>
+                </a:ext>
+              </a:extLst>
+            </a:blip>
+            <a:stretch>
+              <a:fillRect/>
+            </a:stretch>
+          </p:blipFill>
+          <p:spPr>
+            <a:xfrm>
+              <a:off x="7341108" y="3472304"/>
+              <a:ext cx="381000" cy="381000"/>
+            </a:xfrm>
+            <a:prstGeom prst="rect">
+              <a:avLst/>
+            </a:prstGeom>
+          </p:spPr>
+        </p:pic>
+        <p:pic>
+          <p:nvPicPr>
+            <p:cNvPr id="6" name="Graphic 5">
+              <a:extLst>
+                <a:ext uri="{FF2B5EF4-FFF2-40B4-BE49-F238E27FC236}">
+                  <a16:creationId xmlns:a16="http://schemas.microsoft.com/office/drawing/2014/main" id="{50073BC1-721C-0802-8A9F-684ED346BAC4}"/>
+                </a:ext>
+              </a:extLst>
+            </p:cNvPr>
+            <p:cNvPicPr>
+              <a:picLocks noChangeAspect="1"/>
+            </p:cNvPicPr>
+            <p:nvPr/>
+          </p:nvPicPr>
+          <p:blipFill>
+            <a:blip r:embed="rId6">
+              <a:extLst>
+                <a:ext uri="{28A0092B-C50C-407E-A947-70E740481C1C}">
+                  <a14:useLocalDpi xmlns:a14="http://schemas.microsoft.com/office/drawing/2010/main" val="0"/>
+                </a:ext>
+                <a:ext uri="{96DAC541-7B7A-43D3-8B79-37D633B846F1}">
+                  <asvg:svgBlip xmlns:asvg="http://schemas.microsoft.com/office/drawing/2016/SVG/main" r:embed="rId7"/>
+                </a:ext>
+              </a:extLst>
+            </a:blip>
+            <a:stretch>
+              <a:fillRect/>
+            </a:stretch>
+          </p:blipFill>
+          <p:spPr>
+            <a:xfrm>
+              <a:off x="7341108" y="3048000"/>
+              <a:ext cx="381000" cy="381000"/>
+            </a:xfrm>
+            <a:prstGeom prst="rect">
+              <a:avLst/>
+            </a:prstGeom>
+          </p:spPr>
+        </p:pic>
+        <p:pic>
+          <p:nvPicPr>
+            <p:cNvPr id="7" name="Graphic 6">
+              <a:extLst>
+                <a:ext uri="{FF2B5EF4-FFF2-40B4-BE49-F238E27FC236}">
+                  <a16:creationId xmlns:a16="http://schemas.microsoft.com/office/drawing/2014/main" id="{7C7DFE32-7F9B-F5E7-CC8C-AFF0C9A56F9A}"/>
+                </a:ext>
+              </a:extLst>
+            </p:cNvPr>
+            <p:cNvPicPr>
+              <a:picLocks noChangeAspect="1"/>
+            </p:cNvPicPr>
+            <p:nvPr/>
+          </p:nvPicPr>
+          <p:blipFill>
+            <a:blip r:embed="rId8">
+              <a:extLst>
+                <a:ext uri="{28A0092B-C50C-407E-A947-70E740481C1C}">
+                  <a14:useLocalDpi xmlns:a14="http://schemas.microsoft.com/office/drawing/2010/main" val="0"/>
+                </a:ext>
+                <a:ext uri="{96DAC541-7B7A-43D3-8B79-37D633B846F1}">
+                  <asvg:svgBlip xmlns:asvg="http://schemas.microsoft.com/office/drawing/2016/SVG/main" r:embed="rId9"/>
+                </a:ext>
+              </a:extLst>
+            </a:blip>
+            <a:stretch>
+              <a:fillRect/>
+            </a:stretch>
+          </p:blipFill>
+          <p:spPr>
+            <a:xfrm>
+              <a:off x="7341108" y="3896608"/>
+              <a:ext cx="381000" cy="381000"/>
+            </a:xfrm>
+            <a:prstGeom prst="rect">
+              <a:avLst/>
+            </a:prstGeom>
+          </p:spPr>
+        </p:pic>
+        <p:pic>
+          <p:nvPicPr>
+            <p:cNvPr id="8" name="Picture 7">
+              <a:extLst>
+                <a:ext uri="{FF2B5EF4-FFF2-40B4-BE49-F238E27FC236}">
+                  <a16:creationId xmlns:a16="http://schemas.microsoft.com/office/drawing/2014/main" id="{64073DF4-7524-5E74-25AD-6A767AAEFA57}"/>
+                </a:ext>
+              </a:extLst>
+            </p:cNvPr>
+            <p:cNvPicPr>
+              <a:picLocks noChangeAspect="1"/>
+            </p:cNvPicPr>
+            <p:nvPr/>
+          </p:nvPicPr>
+          <p:blipFill>
+            <a:blip r:embed="rId10">
+              <a:extLst>
+                <a:ext uri="{28A0092B-C50C-407E-A947-70E740481C1C}">
+                  <a14:useLocalDpi xmlns:a14="http://schemas.microsoft.com/office/drawing/2010/main" val="0"/>
+                </a:ext>
+              </a:extLst>
+            </a:blip>
+            <a:stretch>
+              <a:fillRect/>
+            </a:stretch>
+          </p:blipFill>
+          <p:spPr>
+            <a:xfrm>
+              <a:off x="7341108" y="4320912"/>
+              <a:ext cx="381000" cy="381000"/>
+            </a:xfrm>
+            <a:prstGeom prst="rect">
+              <a:avLst/>
+            </a:prstGeom>
+          </p:spPr>
+        </p:pic>
+        <p:sp>
+          <p:nvSpPr>
+            <p:cNvPr id="9" name="TextBox 8">
+              <a:extLst>
+                <a:ext uri="{FF2B5EF4-FFF2-40B4-BE49-F238E27FC236}">
+                  <a16:creationId xmlns:a16="http://schemas.microsoft.com/office/drawing/2014/main" id="{5808B03E-7952-2251-09F0-B610575A3805}"/>
+                </a:ext>
+              </a:extLst>
+            </p:cNvPr>
+            <p:cNvSpPr txBox="1"/>
+            <p:nvPr/>
+          </p:nvSpPr>
+          <p:spPr>
+            <a:xfrm>
+              <a:off x="7872984" y="3048000"/>
+              <a:ext cx="1764792" cy="369332"/>
+            </a:xfrm>
+            <a:prstGeom prst="rect">
+              <a:avLst/>
+            </a:prstGeom>
+            <a:noFill/>
+          </p:spPr>
+          <p:txBody>
+            <a:bodyPr wrap="square" rtlCol="0">
+              <a:spAutoFit/>
+            </a:bodyPr>
+            <a:lstStyle/>
+            <a:p>
+              <a:r>
+                <a:rPr lang="en-US" dirty="0" err="1"/>
+                <a:t>codidharma</a:t>
+              </a:r>
+              <a:endParaRPr lang="en-IN" dirty="0"/>
+            </a:p>
+          </p:txBody>
+        </p:sp>
+        <p:sp>
+          <p:nvSpPr>
+            <p:cNvPr id="10" name="TextBox 9">
+              <a:extLst>
+                <a:ext uri="{FF2B5EF4-FFF2-40B4-BE49-F238E27FC236}">
+                  <a16:creationId xmlns:a16="http://schemas.microsoft.com/office/drawing/2014/main" id="{5E5C34D1-8329-CDB2-F1BA-D330137058CA}"/>
+                </a:ext>
+              </a:extLst>
+            </p:cNvPr>
+            <p:cNvSpPr txBox="1"/>
+            <p:nvPr/>
+          </p:nvSpPr>
+          <p:spPr>
+            <a:xfrm>
+              <a:off x="7872984" y="3396104"/>
+              <a:ext cx="1764792" cy="369332"/>
+            </a:xfrm>
+            <a:prstGeom prst="rect">
+              <a:avLst/>
+            </a:prstGeom>
+            <a:noFill/>
+          </p:spPr>
+          <p:txBody>
+            <a:bodyPr wrap="square" rtlCol="0">
+              <a:spAutoFit/>
+            </a:bodyPr>
+            <a:lstStyle/>
+            <a:p>
+              <a:r>
+                <a:rPr lang="en-US" dirty="0"/>
+                <a:t>@codidharma</a:t>
+              </a:r>
+              <a:endParaRPr lang="en-IN" dirty="0"/>
+            </a:p>
+          </p:txBody>
+        </p:sp>
+        <p:sp>
+          <p:nvSpPr>
+            <p:cNvPr id="11" name="TextBox 10">
+              <a:extLst>
+                <a:ext uri="{FF2B5EF4-FFF2-40B4-BE49-F238E27FC236}">
+                  <a16:creationId xmlns:a16="http://schemas.microsoft.com/office/drawing/2014/main" id="{076E671F-889E-8B30-8814-2387EBDD1BCF}"/>
+                </a:ext>
+              </a:extLst>
+            </p:cNvPr>
+            <p:cNvSpPr txBox="1"/>
+            <p:nvPr/>
+          </p:nvSpPr>
+          <p:spPr>
+            <a:xfrm>
+              <a:off x="7872984" y="3778822"/>
+              <a:ext cx="3273552" cy="369332"/>
+            </a:xfrm>
+            <a:prstGeom prst="rect">
+              <a:avLst/>
+            </a:prstGeom>
+            <a:noFill/>
+          </p:spPr>
+          <p:txBody>
+            <a:bodyPr wrap="square" rtlCol="0">
+              <a:spAutoFit/>
+            </a:bodyPr>
+            <a:lstStyle/>
+            <a:p>
+              <a:r>
+                <a:rPr lang="en-US" dirty="0"/>
+                <a:t>mandar-</a:t>
+              </a:r>
+              <a:r>
+                <a:rPr lang="en-US" dirty="0" err="1"/>
+                <a:t>dharmadhikari</a:t>
+              </a:r>
+              <a:endParaRPr lang="en-IN" dirty="0"/>
+            </a:p>
+          </p:txBody>
+        </p:sp>
+        <p:sp>
+          <p:nvSpPr>
+            <p:cNvPr id="12" name="TextBox 11">
+              <a:extLst>
+                <a:ext uri="{FF2B5EF4-FFF2-40B4-BE49-F238E27FC236}">
+                  <a16:creationId xmlns:a16="http://schemas.microsoft.com/office/drawing/2014/main" id="{8081B276-8FD0-6386-F69B-A6B5FBC86B6D}"/>
+                </a:ext>
+              </a:extLst>
+            </p:cNvPr>
+            <p:cNvSpPr txBox="1"/>
+            <p:nvPr/>
+          </p:nvSpPr>
+          <p:spPr>
+            <a:xfrm>
+              <a:off x="7872984" y="4277608"/>
+              <a:ext cx="3273552" cy="369332"/>
+            </a:xfrm>
+            <a:prstGeom prst="rect">
+              <a:avLst/>
+            </a:prstGeom>
+            <a:noFill/>
+          </p:spPr>
+          <p:txBody>
+            <a:bodyPr wrap="square" rtlCol="0">
+              <a:spAutoFit/>
+            </a:bodyPr>
+            <a:lstStyle/>
+            <a:p>
+              <a:r>
+                <a:rPr lang="en-US" dirty="0"/>
+                <a:t>https://codidharma.com</a:t>
+              </a:r>
+              <a:endParaRPr lang="en-IN" dirty="0"/>
+            </a:p>
+          </p:txBody>
+        </p:sp>
+      </p:grpSp>
+    </p:spTree>
+    <p:extLst>
+      <p:ext uri="{BB962C8B-B14F-4D97-AF65-F5344CB8AC3E}">
+        <p14:creationId xmlns:p14="http://schemas.microsoft.com/office/powerpoint/2010/main" val="4018789356"/>
+      </p:ext>
+    </p:extLst>
+  </p:cSld>
+  <p:clrMapOvr>
+    <a:masterClrMapping/>
+  </p:clrMapOvr>
+</p:sld>
+</file>
+
 <file path=ppt/slides/slide3.xml><?xml version="1.0" encoding="utf-8"?>
 <p:sld xmlns:a="http://schemas.openxmlformats.org/drawingml/2006/main" xmlns:r="http://schemas.openxmlformats.org/officeDocument/2006/relationships" xmlns:p="http://schemas.openxmlformats.org/presentationml/2006/main">
   <p:cSld>
@@ -9119,7 +10900,7 @@
             </a:pPr>
             <a:r>
               <a:rPr lang="en-US" dirty="0"/>
-              <a:t>Study use cases and make a decision whether to use Power Automate or Logic Apps</a:t>
+              <a:t>Study use case and make a decision whether to use Power Automate or Logic Apps</a:t>
             </a:r>
             <a:endParaRPr lang="en-IN" dirty="0"/>
           </a:p>
@@ -10592,6 +12373,7 @@
           </a:bodyPr>
           <a:lstStyle/>
           <a:p>
+            <a:pPr algn="l"/>
             <a:r>
               <a:rPr lang="en-US" dirty="0"/>
               <a:t>Power Platform: AN Introduction</a:t>
@@ -11495,13 +13277,8 @@
             </a:r>
             <a:r>
               <a:rPr lang="en-US" dirty="0"/>
-              <a:t>: These are the flows used to automate business processes like approvals, teams creation, employee onboarding etc. These flows can be scheduled, automated, triggered from mobiles using Power Automate mobile </a:t>
-            </a:r>
-            <a:r>
-              <a:rPr lang="en-US" dirty="0" err="1"/>
-              <a:t>etc</a:t>
-            </a:r>
-            <a:endParaRPr lang="en-US" dirty="0"/>
+              <a:t>: These are the flows used to automate business processes like approvals, teams creation, employee onboarding etc. These flows can be scheduled, automated, triggered from mobiles using Power Automate mobile etc.</a:t>
+            </a:r>
           </a:p>
           <a:p>
             <a:pPr lvl="1"/>
@@ -11841,6 +13618,12 @@
             <a:r>
               <a:rPr lang="en-US" dirty="0"/>
               <a:t>Security</a:t>
+            </a:r>
+          </a:p>
+          <a:p>
+            <a:r>
+              <a:rPr lang="en-US" dirty="0"/>
+              <a:t>Design and Build</a:t>
             </a:r>
           </a:p>
           <a:p>

</xml_diff>